<commit_message>
:art: Update: Image Sources
</commit_message>
<xml_diff>
--- a/portal/public/data/LOGO.pptx
+++ b/portal/public/data/LOGO.pptx
@@ -5,14 +5,17 @@
     <p:sldMasterId id="2147483648" r:id="rId4"/>
   </p:sldMasterIdLst>
   <p:sldIdLst>
-    <p:sldId id="262" r:id="rId5"/>
-    <p:sldId id="256" r:id="rId6"/>
-    <p:sldId id="257" r:id="rId7"/>
-    <p:sldId id="258" r:id="rId8"/>
-    <p:sldId id="259" r:id="rId9"/>
-    <p:sldId id="260" r:id="rId10"/>
-    <p:sldId id="261" r:id="rId11"/>
-    <p:sldId id="263" r:id="rId12"/>
+    <p:sldId id="264" r:id="rId5"/>
+    <p:sldId id="266" r:id="rId6"/>
+    <p:sldId id="262" r:id="rId7"/>
+    <p:sldId id="265" r:id="rId8"/>
+    <p:sldId id="256" r:id="rId9"/>
+    <p:sldId id="257" r:id="rId10"/>
+    <p:sldId id="258" r:id="rId11"/>
+    <p:sldId id="259" r:id="rId12"/>
+    <p:sldId id="260" r:id="rId13"/>
+    <p:sldId id="261" r:id="rId14"/>
+    <p:sldId id="263" r:id="rId15"/>
   </p:sldIdLst>
   <p:sldSz cx="12192000" cy="6858000"/>
   <p:notesSz cx="6858000" cy="9144000"/>
@@ -266,7 +269,7 @@
           <a:p>
             <a:fld id="{B1E4AD65-7308-469A-9D9A-1620AD060EFD}" type="datetimeFigureOut">
               <a:rPr lang="ko-KR" altLang="en-US" smtClean="0"/>
-              <a:t>2023. 8. 21.</a:t>
+              <a:t>2023-08-22</a:t>
             </a:fld>
             <a:endParaRPr lang="ko-KR" altLang="en-US"/>
           </a:p>
@@ -464,7 +467,7 @@
           <a:p>
             <a:fld id="{B1E4AD65-7308-469A-9D9A-1620AD060EFD}" type="datetimeFigureOut">
               <a:rPr lang="ko-KR" altLang="en-US" smtClean="0"/>
-              <a:t>2023. 8. 21.</a:t>
+              <a:t>2023-08-22</a:t>
             </a:fld>
             <a:endParaRPr lang="ko-KR" altLang="en-US"/>
           </a:p>
@@ -672,7 +675,7 @@
           <a:p>
             <a:fld id="{B1E4AD65-7308-469A-9D9A-1620AD060EFD}" type="datetimeFigureOut">
               <a:rPr lang="ko-KR" altLang="en-US" smtClean="0"/>
-              <a:t>2023. 8. 21.</a:t>
+              <a:t>2023-08-22</a:t>
             </a:fld>
             <a:endParaRPr lang="ko-KR" altLang="en-US"/>
           </a:p>
@@ -870,7 +873,7 @@
           <a:p>
             <a:fld id="{B1E4AD65-7308-469A-9D9A-1620AD060EFD}" type="datetimeFigureOut">
               <a:rPr lang="ko-KR" altLang="en-US" smtClean="0"/>
-              <a:t>2023. 8. 21.</a:t>
+              <a:t>2023-08-22</a:t>
             </a:fld>
             <a:endParaRPr lang="ko-KR" altLang="en-US"/>
           </a:p>
@@ -1145,7 +1148,7 @@
           <a:p>
             <a:fld id="{B1E4AD65-7308-469A-9D9A-1620AD060EFD}" type="datetimeFigureOut">
               <a:rPr lang="ko-KR" altLang="en-US" smtClean="0"/>
-              <a:t>2023. 8. 21.</a:t>
+              <a:t>2023-08-22</a:t>
             </a:fld>
             <a:endParaRPr lang="ko-KR" altLang="en-US"/>
           </a:p>
@@ -1410,7 +1413,7 @@
           <a:p>
             <a:fld id="{B1E4AD65-7308-469A-9D9A-1620AD060EFD}" type="datetimeFigureOut">
               <a:rPr lang="ko-KR" altLang="en-US" smtClean="0"/>
-              <a:t>2023. 8. 21.</a:t>
+              <a:t>2023-08-22</a:t>
             </a:fld>
             <a:endParaRPr lang="ko-KR" altLang="en-US"/>
           </a:p>
@@ -1822,7 +1825,7 @@
           <a:p>
             <a:fld id="{B1E4AD65-7308-469A-9D9A-1620AD060EFD}" type="datetimeFigureOut">
               <a:rPr lang="ko-KR" altLang="en-US" smtClean="0"/>
-              <a:t>2023. 8. 21.</a:t>
+              <a:t>2023-08-22</a:t>
             </a:fld>
             <a:endParaRPr lang="ko-KR" altLang="en-US"/>
           </a:p>
@@ -1963,7 +1966,7 @@
           <a:p>
             <a:fld id="{B1E4AD65-7308-469A-9D9A-1620AD060EFD}" type="datetimeFigureOut">
               <a:rPr lang="ko-KR" altLang="en-US" smtClean="0"/>
-              <a:t>2023. 8. 21.</a:t>
+              <a:t>2023-08-22</a:t>
             </a:fld>
             <a:endParaRPr lang="ko-KR" altLang="en-US"/>
           </a:p>
@@ -2076,7 +2079,7 @@
           <a:p>
             <a:fld id="{B1E4AD65-7308-469A-9D9A-1620AD060EFD}" type="datetimeFigureOut">
               <a:rPr lang="ko-KR" altLang="en-US" smtClean="0"/>
-              <a:t>2023. 8. 21.</a:t>
+              <a:t>2023-08-22</a:t>
             </a:fld>
             <a:endParaRPr lang="ko-KR" altLang="en-US"/>
           </a:p>
@@ -2387,7 +2390,7 @@
           <a:p>
             <a:fld id="{B1E4AD65-7308-469A-9D9A-1620AD060EFD}" type="datetimeFigureOut">
               <a:rPr lang="ko-KR" altLang="en-US" smtClean="0"/>
-              <a:t>2023. 8. 21.</a:t>
+              <a:t>2023-08-22</a:t>
             </a:fld>
             <a:endParaRPr lang="ko-KR" altLang="en-US"/>
           </a:p>
@@ -2675,7 +2678,7 @@
           <a:p>
             <a:fld id="{B1E4AD65-7308-469A-9D9A-1620AD060EFD}" type="datetimeFigureOut">
               <a:rPr lang="ko-KR" altLang="en-US" smtClean="0"/>
-              <a:t>2023. 8. 21.</a:t>
+              <a:t>2023-08-22</a:t>
             </a:fld>
             <a:endParaRPr lang="ko-KR" altLang="en-US"/>
           </a:p>
@@ -2916,7 +2919,7 @@
           <a:p>
             <a:fld id="{B1E4AD65-7308-469A-9D9A-1620AD060EFD}" type="datetimeFigureOut">
               <a:rPr lang="ko-KR" altLang="en-US" smtClean="0"/>
-              <a:t>2023. 8. 21.</a:t>
+              <a:t>2023-08-22</a:t>
             </a:fld>
             <a:endParaRPr lang="ko-KR" altLang="en-US"/>
           </a:p>
@@ -3333,56 +3336,522 @@
           <a:chExt cx="0" cy="0"/>
         </a:xfrm>
       </p:grpSpPr>
-      <p:sp>
-        <p:nvSpPr>
-          <p:cNvPr id="2" name="직사각형 1">
-            <a:extLst>
-              <a:ext uri="{FF2B5EF4-FFF2-40B4-BE49-F238E27FC236}">
-                <a16:creationId xmlns:a16="http://schemas.microsoft.com/office/drawing/2014/main" id="{D0085799-1B7C-3887-5E34-80C71150B74B}"/>
-              </a:ext>
-            </a:extLst>
-          </p:cNvPr>
-          <p:cNvSpPr/>
+      <p:pic>
+        <p:nvPicPr>
+          <p:cNvPr id="5" name="그림 4" descr="블랙, 어둠이(가) 표시된 사진&#10;&#10;자동 생성된 설명">
+            <a:extLst>
+              <a:ext uri="{FF2B5EF4-FFF2-40B4-BE49-F238E27FC236}">
+                <a16:creationId xmlns:a16="http://schemas.microsoft.com/office/drawing/2014/main" id="{F4088AA3-ACE9-BE6F-E18A-7B9930BB9DB0}"/>
+              </a:ext>
+            </a:extLst>
+          </p:cNvPr>
+          <p:cNvPicPr>
+            <a:picLocks noChangeAspect="1"/>
+          </p:cNvPicPr>
           <p:nvPr/>
-        </p:nvSpPr>
+        </p:nvPicPr>
+        <p:blipFill rotWithShape="1">
+          <a:blip r:embed="rId2">
+            <a:extLst>
+              <a:ext uri="{28A0092B-C50C-407E-A947-70E740481C1C}">
+                <a14:useLocalDpi xmlns:a14="http://schemas.microsoft.com/office/drawing/2010/main" val="0"/>
+              </a:ext>
+            </a:extLst>
+          </a:blip>
+          <a:srcRect t="-33025"/>
+          <a:stretch/>
+        </p:blipFill>
         <p:spPr>
           <a:xfrm>
-            <a:off x="1724660" y="-800100"/>
-            <a:ext cx="8458200" cy="8458200"/>
+            <a:off x="842962" y="396230"/>
+            <a:ext cx="12192000" cy="5494040"/>
           </a:xfrm>
           <a:prstGeom prst="rect">
             <a:avLst/>
           </a:prstGeom>
-          <a:solidFill>
-            <a:schemeClr val="bg1"/>
-          </a:solidFill>
-          <a:ln>
-            <a:noFill/>
-          </a:ln>
         </p:spPr>
-        <p:style>
-          <a:lnRef idx="2">
-            <a:schemeClr val="accent1">
-              <a:shade val="15000"/>
-            </a:schemeClr>
-          </a:lnRef>
-          <a:fillRef idx="1">
-            <a:schemeClr val="accent1"/>
-          </a:fillRef>
-          <a:effectRef idx="0">
-            <a:schemeClr val="accent1"/>
-          </a:effectRef>
-          <a:fontRef idx="minor">
-            <a:schemeClr val="lt1"/>
-          </a:fontRef>
-        </p:style>
-        <p:txBody>
-          <a:bodyPr rtlCol="0" anchor="ctr"/>
+      </p:pic>
+    </p:spTree>
+    <p:extLst>
+      <p:ext uri="{BB962C8B-B14F-4D97-AF65-F5344CB8AC3E}">
+        <p14:creationId xmlns:p14="http://schemas.microsoft.com/office/powerpoint/2010/main" val="739794230"/>
+      </p:ext>
+    </p:extLst>
+  </p:cSld>
+  <p:clrMapOvr>
+    <a:masterClrMapping/>
+  </p:clrMapOvr>
+</p:sld>
+</file>
+
+<file path=ppt/slides/slide10.xml><?xml version="1.0" encoding="utf-8"?>
+<p:sld xmlns:a="http://schemas.openxmlformats.org/drawingml/2006/main" xmlns:r="http://schemas.openxmlformats.org/officeDocument/2006/relationships" xmlns:p="http://schemas.openxmlformats.org/presentationml/2006/main">
+  <p:cSld>
+    <p:spTree>
+      <p:nvGrpSpPr>
+        <p:cNvPr id="1" name=""/>
+        <p:cNvGrpSpPr/>
+        <p:nvPr/>
+      </p:nvGrpSpPr>
+      <p:grpSpPr>
+        <a:xfrm>
+          <a:off x="0" y="0"/>
+          <a:ext cx="0" cy="0"/>
+          <a:chOff x="0" y="0"/>
+          <a:chExt cx="0" cy="0"/>
+        </a:xfrm>
+      </p:grpSpPr>
+      <p:grpSp>
+        <p:nvGrpSpPr>
+          <p:cNvPr id="5" name="그룹 4">
+            <a:extLst>
+              <a:ext uri="{FF2B5EF4-FFF2-40B4-BE49-F238E27FC236}">
+                <a16:creationId xmlns:a16="http://schemas.microsoft.com/office/drawing/2014/main" id="{1E07410E-1C27-BA9E-F61D-67639657B92B}"/>
+              </a:ext>
+            </a:extLst>
+          </p:cNvPr>
+          <p:cNvGrpSpPr/>
+          <p:nvPr/>
+        </p:nvGrpSpPr>
+        <p:grpSpPr>
+          <a:xfrm>
+            <a:off x="1866900" y="-800100"/>
+            <a:ext cx="8458200" cy="8458200"/>
+            <a:chOff x="1370844" y="-1416806"/>
+            <a:chExt cx="8458200" cy="8458200"/>
+          </a:xfrm>
+        </p:grpSpPr>
+        <p:sp>
+          <p:nvSpPr>
+            <p:cNvPr id="2" name="직사각형 1">
+              <a:extLst>
+                <a:ext uri="{FF2B5EF4-FFF2-40B4-BE49-F238E27FC236}">
+                  <a16:creationId xmlns:a16="http://schemas.microsoft.com/office/drawing/2014/main" id="{97EB2177-EFF4-BC7C-529B-BFADD7CD6BB9}"/>
+                </a:ext>
+              </a:extLst>
+            </p:cNvPr>
+            <p:cNvSpPr/>
+            <p:nvPr/>
+          </p:nvSpPr>
+          <p:spPr>
+            <a:xfrm>
+              <a:off x="1370844" y="-1416806"/>
+              <a:ext cx="8458200" cy="8458200"/>
+            </a:xfrm>
+            <a:prstGeom prst="rect">
+              <a:avLst/>
+            </a:prstGeom>
+            <a:solidFill>
+              <a:schemeClr val="bg1"/>
+            </a:solidFill>
+            <a:ln>
+              <a:noFill/>
+            </a:ln>
+          </p:spPr>
+          <p:style>
+            <a:lnRef idx="2">
+              <a:schemeClr val="accent1">
+                <a:shade val="15000"/>
+              </a:schemeClr>
+            </a:lnRef>
+            <a:fillRef idx="1">
+              <a:schemeClr val="accent1"/>
+            </a:fillRef>
+            <a:effectRef idx="0">
+              <a:schemeClr val="accent1"/>
+            </a:effectRef>
+            <a:fontRef idx="minor">
+              <a:schemeClr val="lt1"/>
+            </a:fontRef>
+          </p:style>
+          <p:txBody>
+            <a:bodyPr rtlCol="0" anchor="ctr"/>
+            <a:lstStyle/>
+            <a:p>
+              <a:pPr algn="ctr"/>
+              <a:endParaRPr lang="ko-KR" altLang="en-US"/>
+            </a:p>
+          </p:txBody>
+        </p:sp>
+        <p:pic>
+          <p:nvPicPr>
+            <p:cNvPr id="4" name="그림 3" descr="클립아트, 만화 영화, 일러스트레이션, 그림이(가) 표시된 사진&#10;&#10;자동 생성된 설명">
+              <a:extLst>
+                <a:ext uri="{FF2B5EF4-FFF2-40B4-BE49-F238E27FC236}">
+                  <a16:creationId xmlns:a16="http://schemas.microsoft.com/office/drawing/2014/main" id="{144D6E2E-80BC-EB85-1A83-A80122C4F965}"/>
+                </a:ext>
+              </a:extLst>
+            </p:cNvPr>
+            <p:cNvPicPr>
+              <a:picLocks noChangeAspect="1"/>
+            </p:cNvPicPr>
+            <p:nvPr/>
+          </p:nvPicPr>
+          <p:blipFill>
+            <a:blip r:embed="rId2">
+              <a:extLst>
+                <a:ext uri="{28A0092B-C50C-407E-A947-70E740481C1C}">
+                  <a14:useLocalDpi xmlns:a14="http://schemas.microsoft.com/office/drawing/2010/main" val="0"/>
+                </a:ext>
+              </a:extLst>
+            </a:blip>
+            <a:stretch>
+              <a:fillRect/>
+            </a:stretch>
+          </p:blipFill>
+          <p:spPr>
+            <a:xfrm>
+              <a:off x="1550156" y="-1237494"/>
+              <a:ext cx="8099577" cy="8099577"/>
+            </a:xfrm>
+            <a:prstGeom prst="rect">
+              <a:avLst/>
+            </a:prstGeom>
+          </p:spPr>
+        </p:pic>
+      </p:grpSp>
+    </p:spTree>
+    <p:extLst>
+      <p:ext uri="{BB962C8B-B14F-4D97-AF65-F5344CB8AC3E}">
+        <p14:creationId xmlns:p14="http://schemas.microsoft.com/office/powerpoint/2010/main" val="2069779280"/>
+      </p:ext>
+    </p:extLst>
+  </p:cSld>
+  <p:clrMapOvr>
+    <a:masterClrMapping/>
+  </p:clrMapOvr>
+</p:sld>
+</file>
+
+<file path=ppt/slides/slide11.xml><?xml version="1.0" encoding="utf-8"?>
+<p:sld xmlns:a="http://schemas.openxmlformats.org/drawingml/2006/main" xmlns:r="http://schemas.openxmlformats.org/officeDocument/2006/relationships" xmlns:p="http://schemas.openxmlformats.org/presentationml/2006/main">
+  <p:cSld>
+    <p:spTree>
+      <p:nvGrpSpPr>
+        <p:cNvPr id="1" name=""/>
+        <p:cNvGrpSpPr/>
+        <p:nvPr/>
+      </p:nvGrpSpPr>
+      <p:grpSpPr>
+        <a:xfrm>
+          <a:off x="0" y="0"/>
+          <a:ext cx="0" cy="0"/>
+          <a:chOff x="0" y="0"/>
+          <a:chExt cx="0" cy="0"/>
+        </a:xfrm>
+      </p:grpSpPr>
+      <p:grpSp>
+        <p:nvGrpSpPr>
+          <p:cNvPr id="4" name="그룹 3">
+            <a:extLst>
+              <a:ext uri="{FF2B5EF4-FFF2-40B4-BE49-F238E27FC236}">
+                <a16:creationId xmlns:a16="http://schemas.microsoft.com/office/drawing/2014/main" id="{AC07429C-F192-108F-87A2-101629CFDBAC}"/>
+              </a:ext>
+            </a:extLst>
+          </p:cNvPr>
+          <p:cNvGrpSpPr/>
+          <p:nvPr/>
+        </p:nvGrpSpPr>
+        <p:grpSpPr>
+          <a:xfrm>
+            <a:off x="1866900" y="-800100"/>
+            <a:ext cx="8458200" cy="8458200"/>
+            <a:chOff x="1866900" y="-800100"/>
+            <a:chExt cx="8458200" cy="8458200"/>
+          </a:xfrm>
+        </p:grpSpPr>
+        <p:sp>
+          <p:nvSpPr>
+            <p:cNvPr id="5" name="직사각형 4">
+              <a:extLst>
+                <a:ext uri="{FF2B5EF4-FFF2-40B4-BE49-F238E27FC236}">
+                  <a16:creationId xmlns:a16="http://schemas.microsoft.com/office/drawing/2014/main" id="{B898AC64-58F7-A5AC-962E-749B9AA30F53}"/>
+                </a:ext>
+              </a:extLst>
+            </p:cNvPr>
+            <p:cNvSpPr/>
+            <p:nvPr/>
+          </p:nvSpPr>
+          <p:spPr>
+            <a:xfrm>
+              <a:off x="1866900" y="-800100"/>
+              <a:ext cx="8458200" cy="8458200"/>
+            </a:xfrm>
+            <a:prstGeom prst="rect">
+              <a:avLst/>
+            </a:prstGeom>
+            <a:solidFill>
+              <a:schemeClr val="bg1"/>
+            </a:solidFill>
+            <a:ln>
+              <a:noFill/>
+            </a:ln>
+          </p:spPr>
+          <p:style>
+            <a:lnRef idx="2">
+              <a:schemeClr val="accent1">
+                <a:shade val="15000"/>
+              </a:schemeClr>
+            </a:lnRef>
+            <a:fillRef idx="1">
+              <a:schemeClr val="accent1"/>
+            </a:fillRef>
+            <a:effectRef idx="0">
+              <a:schemeClr val="accent1"/>
+            </a:effectRef>
+            <a:fontRef idx="minor">
+              <a:schemeClr val="lt1"/>
+            </a:fontRef>
+          </p:style>
+          <p:txBody>
+            <a:bodyPr rtlCol="0" anchor="ctr"/>
+            <a:lstStyle/>
+            <a:p>
+              <a:pPr algn="ctr"/>
+              <a:endParaRPr lang="ko-KR" altLang="en-US"/>
+            </a:p>
+          </p:txBody>
+        </p:sp>
+        <p:pic>
+          <p:nvPicPr>
+            <p:cNvPr id="3" name="그래픽 2">
+              <a:extLst>
+                <a:ext uri="{FF2B5EF4-FFF2-40B4-BE49-F238E27FC236}">
+                  <a16:creationId xmlns:a16="http://schemas.microsoft.com/office/drawing/2014/main" id="{25815B88-C803-72D0-1910-7446D47E6F71}"/>
+                </a:ext>
+              </a:extLst>
+            </p:cNvPr>
+            <p:cNvPicPr>
+              <a:picLocks noChangeAspect="1"/>
+            </p:cNvPicPr>
+            <p:nvPr/>
+          </p:nvPicPr>
+          <p:blipFill>
+            <a:blip r:embed="rId2">
+              <a:extLst>
+                <a:ext uri="{28A0092B-C50C-407E-A947-70E740481C1C}">
+                  <a14:useLocalDpi xmlns:a14="http://schemas.microsoft.com/office/drawing/2010/main" val="0"/>
+                </a:ext>
+                <a:ext uri="{96DAC541-7B7A-43D3-8B79-37D633B846F1}">
+                  <asvg:svgBlip xmlns:asvg="http://schemas.microsoft.com/office/drawing/2016/SVG/main" r:embed="rId3"/>
+                </a:ext>
+              </a:extLst>
+            </a:blip>
+            <a:stretch>
+              <a:fillRect/>
+            </a:stretch>
+          </p:blipFill>
+          <p:spPr>
+            <a:xfrm>
+              <a:off x="2324100" y="-342900"/>
+              <a:ext cx="7543800" cy="7543800"/>
+            </a:xfrm>
+            <a:prstGeom prst="rect">
+              <a:avLst/>
+            </a:prstGeom>
+          </p:spPr>
+        </p:pic>
+      </p:grpSp>
+    </p:spTree>
+    <p:extLst>
+      <p:ext uri="{BB962C8B-B14F-4D97-AF65-F5344CB8AC3E}">
+        <p14:creationId xmlns:p14="http://schemas.microsoft.com/office/powerpoint/2010/main" val="1816107592"/>
+      </p:ext>
+    </p:extLst>
+  </p:cSld>
+  <p:clrMapOvr>
+    <a:masterClrMapping/>
+  </p:clrMapOvr>
+</p:sld>
+</file>
+
+<file path=ppt/slides/slide2.xml><?xml version="1.0" encoding="utf-8"?>
+<p:sld xmlns:a="http://schemas.openxmlformats.org/drawingml/2006/main" xmlns:r="http://schemas.openxmlformats.org/officeDocument/2006/relationships" xmlns:p="http://schemas.openxmlformats.org/presentationml/2006/main">
+  <p:cSld>
+    <p:spTree>
+      <p:nvGrpSpPr>
+        <p:cNvPr id="1" name=""/>
+        <p:cNvGrpSpPr/>
+        <p:nvPr/>
+      </p:nvGrpSpPr>
+      <p:grpSpPr>
+        <a:xfrm>
+          <a:off x="0" y="0"/>
+          <a:ext cx="0" cy="0"/>
+          <a:chOff x="0" y="0"/>
+          <a:chExt cx="0" cy="0"/>
+        </a:xfrm>
+      </p:grpSpPr>
+      <p:grpSp>
+        <p:nvGrpSpPr>
+          <p:cNvPr id="4" name="그룹 3">
+            <a:extLst>
+              <a:ext uri="{FF2B5EF4-FFF2-40B4-BE49-F238E27FC236}">
+                <a16:creationId xmlns:a16="http://schemas.microsoft.com/office/drawing/2014/main" id="{35F6EFAB-C0A7-D8F4-92EB-26E5DCA3BFA8}"/>
+              </a:ext>
+            </a:extLst>
+          </p:cNvPr>
+          <p:cNvGrpSpPr/>
+          <p:nvPr/>
+        </p:nvGrpSpPr>
+        <p:grpSpPr>
+          <a:xfrm>
+            <a:off x="1866900" y="-800100"/>
+            <a:ext cx="8458200" cy="8458200"/>
+            <a:chOff x="1866900" y="-800100"/>
+            <a:chExt cx="8458200" cy="8458200"/>
+          </a:xfrm>
+        </p:grpSpPr>
+        <p:sp>
+          <p:nvSpPr>
+            <p:cNvPr id="5" name="직사각형 4">
+              <a:extLst>
+                <a:ext uri="{FF2B5EF4-FFF2-40B4-BE49-F238E27FC236}">
+                  <a16:creationId xmlns:a16="http://schemas.microsoft.com/office/drawing/2014/main" id="{B898AC64-58F7-A5AC-962E-749B9AA30F53}"/>
+                </a:ext>
+              </a:extLst>
+            </p:cNvPr>
+            <p:cNvSpPr/>
+            <p:nvPr/>
+          </p:nvSpPr>
+          <p:spPr>
+            <a:xfrm>
+              <a:off x="1866900" y="-800100"/>
+              <a:ext cx="8458200" cy="8458200"/>
+            </a:xfrm>
+            <a:prstGeom prst="rect">
+              <a:avLst/>
+            </a:prstGeom>
+            <a:solidFill>
+              <a:schemeClr val="bg1"/>
+            </a:solidFill>
+            <a:ln>
+              <a:noFill/>
+            </a:ln>
+          </p:spPr>
+          <p:style>
+            <a:lnRef idx="2">
+              <a:schemeClr val="accent1">
+                <a:shade val="15000"/>
+              </a:schemeClr>
+            </a:lnRef>
+            <a:fillRef idx="1">
+              <a:schemeClr val="accent1"/>
+            </a:fillRef>
+            <a:effectRef idx="0">
+              <a:schemeClr val="accent1"/>
+            </a:effectRef>
+            <a:fontRef idx="minor">
+              <a:schemeClr val="lt1"/>
+            </a:fontRef>
+          </p:style>
+          <p:txBody>
+            <a:bodyPr rtlCol="0" anchor="ctr"/>
+            <a:lstStyle/>
+            <a:p>
+              <a:pPr algn="ctr"/>
+              <a:endParaRPr lang="ko-KR" altLang="en-US"/>
+            </a:p>
+          </p:txBody>
+        </p:sp>
+        <p:pic>
+          <p:nvPicPr>
+            <p:cNvPr id="3" name="그림 2" descr="고양이, 포유류, 실루엣이(가) 표시된 사진&#10;&#10;자동 생성된 설명">
+              <a:extLst>
+                <a:ext uri="{FF2B5EF4-FFF2-40B4-BE49-F238E27FC236}">
+                  <a16:creationId xmlns:a16="http://schemas.microsoft.com/office/drawing/2014/main" id="{4C859026-4C0C-D034-E141-F220709DB643}"/>
+                </a:ext>
+              </a:extLst>
+            </p:cNvPr>
+            <p:cNvPicPr>
+              <a:picLocks noChangeAspect="1"/>
+            </p:cNvPicPr>
+            <p:nvPr/>
+          </p:nvPicPr>
+          <p:blipFill>
+            <a:blip r:embed="rId2">
+              <a:extLst>
+                <a:ext uri="{28A0092B-C50C-407E-A947-70E740481C1C}">
+                  <a14:useLocalDpi xmlns:a14="http://schemas.microsoft.com/office/drawing/2010/main" val="0"/>
+                </a:ext>
+              </a:extLst>
+            </a:blip>
+            <a:stretch>
+              <a:fillRect/>
+            </a:stretch>
+          </p:blipFill>
+          <p:spPr>
+            <a:xfrm>
+              <a:off x="2292668" y="-374332"/>
+              <a:ext cx="7606665" cy="7606665"/>
+            </a:xfrm>
+            <a:prstGeom prst="rect">
+              <a:avLst/>
+            </a:prstGeom>
+          </p:spPr>
+        </p:pic>
+      </p:grpSp>
+    </p:spTree>
+    <p:extLst>
+      <p:ext uri="{BB962C8B-B14F-4D97-AF65-F5344CB8AC3E}">
+        <p14:creationId xmlns:p14="http://schemas.microsoft.com/office/powerpoint/2010/main" val="458574114"/>
+      </p:ext>
+    </p:extLst>
+  </p:cSld>
+  <p:clrMapOvr>
+    <a:masterClrMapping/>
+  </p:clrMapOvr>
+</p:sld>
+</file>
+
+<file path=ppt/slides/slide3.xml><?xml version="1.0" encoding="utf-8"?>
+<p:sld xmlns:a="http://schemas.openxmlformats.org/drawingml/2006/main" xmlns:r="http://schemas.openxmlformats.org/officeDocument/2006/relationships" xmlns:p="http://schemas.openxmlformats.org/presentationml/2006/main">
+  <p:cSld>
+    <p:spTree>
+      <p:nvGrpSpPr>
+        <p:cNvPr id="1" name=""/>
+        <p:cNvGrpSpPr/>
+        <p:nvPr/>
+      </p:nvGrpSpPr>
+      <p:grpSpPr>
+        <a:xfrm>
+          <a:off x="0" y="0"/>
+          <a:ext cx="0" cy="0"/>
+          <a:chOff x="0" y="0"/>
+          <a:chExt cx="0" cy="0"/>
+        </a:xfrm>
+      </p:grpSpPr>
+      <p:sp>
+        <p:nvSpPr>
+          <p:cNvPr id="7" name="TextBox 6">
+            <a:extLst>
+              <a:ext uri="{FF2B5EF4-FFF2-40B4-BE49-F238E27FC236}">
+                <a16:creationId xmlns:a16="http://schemas.microsoft.com/office/drawing/2014/main" id="{B2E3031B-3C5C-752B-D078-B79C6AE61F58}"/>
+              </a:ext>
+            </a:extLst>
+          </p:cNvPr>
+          <p:cNvSpPr txBox="1"/>
+          <p:nvPr/>
+        </p:nvSpPr>
+        <p:spPr>
+          <a:xfrm>
+            <a:off x="1412348" y="1851645"/>
+            <a:ext cx="9367305" cy="3154710"/>
+          </a:xfrm>
+          <a:prstGeom prst="rect">
+            <a:avLst/>
+          </a:prstGeom>
+          <a:noFill/>
+        </p:spPr>
+        <p:txBody>
+          <a:bodyPr wrap="square" rtlCol="0">
+            <a:spAutoFit/>
+          </a:bodyPr>
           <a:lstStyle/>
           <a:p>
             <a:pPr algn="ctr"/>
             <a:r>
-              <a:rPr lang="en-US" altLang="ko-KR" sz="16600" dirty="0" err="1">
+              <a:rPr lang="en-US" altLang="ko-KR" sz="19900" dirty="0" err="1">
                 <a:solidFill>
                   <a:srgbClr val="800A0A"/>
                 </a:solidFill>
@@ -3391,7 +3860,7 @@
               </a:rPr>
               <a:t>Zerohertz</a:t>
             </a:r>
-            <a:endParaRPr lang="ko-KR" altLang="en-US" sz="16600" dirty="0">
+            <a:endParaRPr lang="ko-KR" altLang="en-US" sz="19900" dirty="0">
               <a:solidFill>
                 <a:srgbClr val="800A0A"/>
               </a:solidFill>
@@ -3414,7 +3883,145 @@
 </p:sld>
 </file>
 
-<file path=ppt/slides/slide2.xml><?xml version="1.0" encoding="utf-8"?>
+<file path=ppt/slides/slide4.xml><?xml version="1.0" encoding="utf-8"?>
+<p:sld xmlns:a="http://schemas.openxmlformats.org/drawingml/2006/main" xmlns:r="http://schemas.openxmlformats.org/officeDocument/2006/relationships" xmlns:p="http://schemas.openxmlformats.org/presentationml/2006/main">
+  <p:cSld>
+    <p:spTree>
+      <p:nvGrpSpPr>
+        <p:cNvPr id="1" name=""/>
+        <p:cNvGrpSpPr/>
+        <p:nvPr/>
+      </p:nvGrpSpPr>
+      <p:grpSpPr>
+        <a:xfrm>
+          <a:off x="0" y="0"/>
+          <a:ext cx="0" cy="0"/>
+          <a:chOff x="0" y="0"/>
+          <a:chExt cx="0" cy="0"/>
+        </a:xfrm>
+      </p:grpSpPr>
+      <p:grpSp>
+        <p:nvGrpSpPr>
+          <p:cNvPr id="10" name="그룹 9">
+            <a:extLst>
+              <a:ext uri="{FF2B5EF4-FFF2-40B4-BE49-F238E27FC236}">
+                <a16:creationId xmlns:a16="http://schemas.microsoft.com/office/drawing/2014/main" id="{5E73D279-DB5C-47B3-1F78-C74970945FB0}"/>
+              </a:ext>
+            </a:extLst>
+          </p:cNvPr>
+          <p:cNvGrpSpPr/>
+          <p:nvPr/>
+        </p:nvGrpSpPr>
+        <p:grpSpPr>
+          <a:xfrm>
+            <a:off x="1866900" y="-800100"/>
+            <a:ext cx="8458200" cy="8458200"/>
+            <a:chOff x="2230755" y="-647700"/>
+            <a:chExt cx="8458200" cy="8458200"/>
+          </a:xfrm>
+        </p:grpSpPr>
+        <p:sp>
+          <p:nvSpPr>
+            <p:cNvPr id="9" name="직사각형 8">
+              <a:extLst>
+                <a:ext uri="{FF2B5EF4-FFF2-40B4-BE49-F238E27FC236}">
+                  <a16:creationId xmlns:a16="http://schemas.microsoft.com/office/drawing/2014/main" id="{A36A5CB2-340E-173C-740A-4AF51B88E25E}"/>
+                </a:ext>
+              </a:extLst>
+            </p:cNvPr>
+            <p:cNvSpPr/>
+            <p:nvPr/>
+          </p:nvSpPr>
+          <p:spPr>
+            <a:xfrm>
+              <a:off x="2230755" y="-647700"/>
+              <a:ext cx="8458200" cy="8458200"/>
+            </a:xfrm>
+            <a:prstGeom prst="rect">
+              <a:avLst/>
+            </a:prstGeom>
+            <a:solidFill>
+              <a:schemeClr val="bg1"/>
+            </a:solidFill>
+            <a:ln>
+              <a:noFill/>
+            </a:ln>
+          </p:spPr>
+          <p:style>
+            <a:lnRef idx="2">
+              <a:schemeClr val="accent1">
+                <a:shade val="15000"/>
+              </a:schemeClr>
+            </a:lnRef>
+            <a:fillRef idx="1">
+              <a:schemeClr val="accent1"/>
+            </a:fillRef>
+            <a:effectRef idx="0">
+              <a:schemeClr val="accent1"/>
+            </a:effectRef>
+            <a:fontRef idx="minor">
+              <a:schemeClr val="lt1"/>
+            </a:fontRef>
+          </p:style>
+          <p:txBody>
+            <a:bodyPr rtlCol="0" anchor="ctr"/>
+            <a:lstStyle/>
+            <a:p>
+              <a:pPr algn="ctr"/>
+              <a:endParaRPr lang="ko-KR" altLang="en-US"/>
+            </a:p>
+          </p:txBody>
+        </p:sp>
+        <p:pic>
+          <p:nvPicPr>
+            <p:cNvPr id="8" name="그림 7" descr="폰트, 친필, 그래픽, 서예이(가) 표시된 사진&#10;&#10;자동 생성된 설명">
+              <a:extLst>
+                <a:ext uri="{FF2B5EF4-FFF2-40B4-BE49-F238E27FC236}">
+                  <a16:creationId xmlns:a16="http://schemas.microsoft.com/office/drawing/2014/main" id="{D46A5038-AA48-4BB2-4CD7-B031D948962C}"/>
+                </a:ext>
+              </a:extLst>
+            </p:cNvPr>
+            <p:cNvPicPr>
+              <a:picLocks noChangeAspect="1"/>
+            </p:cNvPicPr>
+            <p:nvPr/>
+          </p:nvPicPr>
+          <p:blipFill rotWithShape="1">
+            <a:blip r:embed="rId2">
+              <a:extLst>
+                <a:ext uri="{28A0092B-C50C-407E-A947-70E740481C1C}">
+                  <a14:useLocalDpi xmlns:a14="http://schemas.microsoft.com/office/drawing/2010/main" val="0"/>
+                </a:ext>
+              </a:extLst>
+            </a:blip>
+            <a:srcRect l="9409" t="8461" r="9409" b="24010"/>
+            <a:stretch/>
+          </p:blipFill>
+          <p:spPr>
+            <a:xfrm>
+              <a:off x="2351815" y="1997572"/>
+              <a:ext cx="8216081" cy="3167656"/>
+            </a:xfrm>
+            <a:prstGeom prst="rect">
+              <a:avLst/>
+            </a:prstGeom>
+          </p:spPr>
+        </p:pic>
+      </p:grpSp>
+    </p:spTree>
+    <p:extLst>
+      <p:ext uri="{BB962C8B-B14F-4D97-AF65-F5344CB8AC3E}">
+        <p14:creationId xmlns:p14="http://schemas.microsoft.com/office/powerpoint/2010/main" val="3876071164"/>
+      </p:ext>
+    </p:extLst>
+  </p:cSld>
+  <p:clrMapOvr>
+    <a:masterClrMapping/>
+  </p:clrMapOvr>
+</p:sld>
+</file>
+
+<file path=ppt/slides/slide5.xml><?xml version="1.0" encoding="utf-8"?>
 <p:sld xmlns:a="http://schemas.openxmlformats.org/drawingml/2006/main" xmlns:r="http://schemas.openxmlformats.org/officeDocument/2006/relationships" xmlns:p="http://schemas.openxmlformats.org/presentationml/2006/main">
   <p:cSld>
     <p:spTree>
@@ -3552,7 +4159,7 @@
 </p:sld>
 </file>
 
-<file path=ppt/slides/slide3.xml><?xml version="1.0" encoding="utf-8"?>
+<file path=ppt/slides/slide6.xml><?xml version="1.0" encoding="utf-8"?>
 <p:sld xmlns:a="http://schemas.openxmlformats.org/drawingml/2006/main" xmlns:r="http://schemas.openxmlformats.org/officeDocument/2006/relationships" xmlns:p="http://schemas.openxmlformats.org/presentationml/2006/main">
   <p:cSld>
     <p:spTree>
@@ -3691,7 +4298,7 @@
 </p:sld>
 </file>
 
-<file path=ppt/slides/slide4.xml><?xml version="1.0" encoding="utf-8"?>
+<file path=ppt/slides/slide7.xml><?xml version="1.0" encoding="utf-8"?>
 <p:sld xmlns:a="http://schemas.openxmlformats.org/drawingml/2006/main" xmlns:r="http://schemas.openxmlformats.org/officeDocument/2006/relationships" xmlns:p="http://schemas.openxmlformats.org/presentationml/2006/main">
   <p:cSld>
     <p:spTree>
@@ -3830,7 +4437,7 @@
 </p:sld>
 </file>
 
-<file path=ppt/slides/slide5.xml><?xml version="1.0" encoding="utf-8"?>
+<file path=ppt/slides/slide8.xml><?xml version="1.0" encoding="utf-8"?>
 <p:sld xmlns:a="http://schemas.openxmlformats.org/drawingml/2006/main" xmlns:r="http://schemas.openxmlformats.org/officeDocument/2006/relationships" xmlns:p="http://schemas.openxmlformats.org/presentationml/2006/main">
   <p:cSld>
     <p:spTree>
@@ -3969,7 +4576,7 @@
 </p:sld>
 </file>
 
-<file path=ppt/slides/slide6.xml><?xml version="1.0" encoding="utf-8"?>
+<file path=ppt/slides/slide9.xml><?xml version="1.0" encoding="utf-8"?>
 <p:sld xmlns:a="http://schemas.openxmlformats.org/drawingml/2006/main" xmlns:r="http://schemas.openxmlformats.org/officeDocument/2006/relationships" xmlns:p="http://schemas.openxmlformats.org/presentationml/2006/main">
   <p:cSld>
     <p:spTree>
@@ -4099,287 +4706,6 @@
     <p:extLst>
       <p:ext uri="{BB962C8B-B14F-4D97-AF65-F5344CB8AC3E}">
         <p14:creationId xmlns:p14="http://schemas.microsoft.com/office/powerpoint/2010/main" val="1823923740"/>
-      </p:ext>
-    </p:extLst>
-  </p:cSld>
-  <p:clrMapOvr>
-    <a:masterClrMapping/>
-  </p:clrMapOvr>
-</p:sld>
-</file>
-
-<file path=ppt/slides/slide7.xml><?xml version="1.0" encoding="utf-8"?>
-<p:sld xmlns:a="http://schemas.openxmlformats.org/drawingml/2006/main" xmlns:r="http://schemas.openxmlformats.org/officeDocument/2006/relationships" xmlns:p="http://schemas.openxmlformats.org/presentationml/2006/main">
-  <p:cSld>
-    <p:spTree>
-      <p:nvGrpSpPr>
-        <p:cNvPr id="1" name=""/>
-        <p:cNvGrpSpPr/>
-        <p:nvPr/>
-      </p:nvGrpSpPr>
-      <p:grpSpPr>
-        <a:xfrm>
-          <a:off x="0" y="0"/>
-          <a:ext cx="0" cy="0"/>
-          <a:chOff x="0" y="0"/>
-          <a:chExt cx="0" cy="0"/>
-        </a:xfrm>
-      </p:grpSpPr>
-      <p:grpSp>
-        <p:nvGrpSpPr>
-          <p:cNvPr id="5" name="그룹 4">
-            <a:extLst>
-              <a:ext uri="{FF2B5EF4-FFF2-40B4-BE49-F238E27FC236}">
-                <a16:creationId xmlns:a16="http://schemas.microsoft.com/office/drawing/2014/main" id="{1E07410E-1C27-BA9E-F61D-67639657B92B}"/>
-              </a:ext>
-            </a:extLst>
-          </p:cNvPr>
-          <p:cNvGrpSpPr/>
-          <p:nvPr/>
-        </p:nvGrpSpPr>
-        <p:grpSpPr>
-          <a:xfrm>
-            <a:off x="1866900" y="-800100"/>
-            <a:ext cx="8458200" cy="8458200"/>
-            <a:chOff x="1370844" y="-1416806"/>
-            <a:chExt cx="8458200" cy="8458200"/>
-          </a:xfrm>
-        </p:grpSpPr>
-        <p:sp>
-          <p:nvSpPr>
-            <p:cNvPr id="2" name="직사각형 1">
-              <a:extLst>
-                <a:ext uri="{FF2B5EF4-FFF2-40B4-BE49-F238E27FC236}">
-                  <a16:creationId xmlns:a16="http://schemas.microsoft.com/office/drawing/2014/main" id="{97EB2177-EFF4-BC7C-529B-BFADD7CD6BB9}"/>
-                </a:ext>
-              </a:extLst>
-            </p:cNvPr>
-            <p:cNvSpPr/>
-            <p:nvPr/>
-          </p:nvSpPr>
-          <p:spPr>
-            <a:xfrm>
-              <a:off x="1370844" y="-1416806"/>
-              <a:ext cx="8458200" cy="8458200"/>
-            </a:xfrm>
-            <a:prstGeom prst="rect">
-              <a:avLst/>
-            </a:prstGeom>
-            <a:solidFill>
-              <a:schemeClr val="bg1"/>
-            </a:solidFill>
-            <a:ln>
-              <a:noFill/>
-            </a:ln>
-          </p:spPr>
-          <p:style>
-            <a:lnRef idx="2">
-              <a:schemeClr val="accent1">
-                <a:shade val="15000"/>
-              </a:schemeClr>
-            </a:lnRef>
-            <a:fillRef idx="1">
-              <a:schemeClr val="accent1"/>
-            </a:fillRef>
-            <a:effectRef idx="0">
-              <a:schemeClr val="accent1"/>
-            </a:effectRef>
-            <a:fontRef idx="minor">
-              <a:schemeClr val="lt1"/>
-            </a:fontRef>
-          </p:style>
-          <p:txBody>
-            <a:bodyPr rtlCol="0" anchor="ctr"/>
-            <a:lstStyle/>
-            <a:p>
-              <a:pPr algn="ctr"/>
-              <a:endParaRPr lang="ko-KR" altLang="en-US"/>
-            </a:p>
-          </p:txBody>
-        </p:sp>
-        <p:pic>
-          <p:nvPicPr>
-            <p:cNvPr id="4" name="그림 3" descr="클립아트, 만화 영화, 일러스트레이션, 그림이(가) 표시된 사진&#10;&#10;자동 생성된 설명">
-              <a:extLst>
-                <a:ext uri="{FF2B5EF4-FFF2-40B4-BE49-F238E27FC236}">
-                  <a16:creationId xmlns:a16="http://schemas.microsoft.com/office/drawing/2014/main" id="{144D6E2E-80BC-EB85-1A83-A80122C4F965}"/>
-                </a:ext>
-              </a:extLst>
-            </p:cNvPr>
-            <p:cNvPicPr>
-              <a:picLocks noChangeAspect="1"/>
-            </p:cNvPicPr>
-            <p:nvPr/>
-          </p:nvPicPr>
-          <p:blipFill>
-            <a:blip r:embed="rId2">
-              <a:extLst>
-                <a:ext uri="{28A0092B-C50C-407E-A947-70E740481C1C}">
-                  <a14:useLocalDpi xmlns:a14="http://schemas.microsoft.com/office/drawing/2010/main" val="0"/>
-                </a:ext>
-              </a:extLst>
-            </a:blip>
-            <a:stretch>
-              <a:fillRect/>
-            </a:stretch>
-          </p:blipFill>
-          <p:spPr>
-            <a:xfrm>
-              <a:off x="1550156" y="-1237494"/>
-              <a:ext cx="8099577" cy="8099577"/>
-            </a:xfrm>
-            <a:prstGeom prst="rect">
-              <a:avLst/>
-            </a:prstGeom>
-          </p:spPr>
-        </p:pic>
-      </p:grpSp>
-    </p:spTree>
-    <p:extLst>
-      <p:ext uri="{BB962C8B-B14F-4D97-AF65-F5344CB8AC3E}">
-        <p14:creationId xmlns:p14="http://schemas.microsoft.com/office/powerpoint/2010/main" val="2069779280"/>
-      </p:ext>
-    </p:extLst>
-  </p:cSld>
-  <p:clrMapOvr>
-    <a:masterClrMapping/>
-  </p:clrMapOvr>
-</p:sld>
-</file>
-
-<file path=ppt/slides/slide8.xml><?xml version="1.0" encoding="utf-8"?>
-<p:sld xmlns:a="http://schemas.openxmlformats.org/drawingml/2006/main" xmlns:r="http://schemas.openxmlformats.org/officeDocument/2006/relationships" xmlns:p="http://schemas.openxmlformats.org/presentationml/2006/main">
-  <p:cSld>
-    <p:spTree>
-      <p:nvGrpSpPr>
-        <p:cNvPr id="1" name=""/>
-        <p:cNvGrpSpPr/>
-        <p:nvPr/>
-      </p:nvGrpSpPr>
-      <p:grpSpPr>
-        <a:xfrm>
-          <a:off x="0" y="0"/>
-          <a:ext cx="0" cy="0"/>
-          <a:chOff x="0" y="0"/>
-          <a:chExt cx="0" cy="0"/>
-        </a:xfrm>
-      </p:grpSpPr>
-      <p:grpSp>
-        <p:nvGrpSpPr>
-          <p:cNvPr id="4" name="그룹 3">
-            <a:extLst>
-              <a:ext uri="{FF2B5EF4-FFF2-40B4-BE49-F238E27FC236}">
-                <a16:creationId xmlns:a16="http://schemas.microsoft.com/office/drawing/2014/main" id="{AC07429C-F192-108F-87A2-101629CFDBAC}"/>
-              </a:ext>
-            </a:extLst>
-          </p:cNvPr>
-          <p:cNvGrpSpPr/>
-          <p:nvPr/>
-        </p:nvGrpSpPr>
-        <p:grpSpPr>
-          <a:xfrm>
-            <a:off x="1866900" y="-800100"/>
-            <a:ext cx="8458200" cy="8458200"/>
-            <a:chOff x="1866900" y="-800100"/>
-            <a:chExt cx="8458200" cy="8458200"/>
-          </a:xfrm>
-        </p:grpSpPr>
-        <p:sp>
-          <p:nvSpPr>
-            <p:cNvPr id="5" name="직사각형 4">
-              <a:extLst>
-                <a:ext uri="{FF2B5EF4-FFF2-40B4-BE49-F238E27FC236}">
-                  <a16:creationId xmlns:a16="http://schemas.microsoft.com/office/drawing/2014/main" id="{B898AC64-58F7-A5AC-962E-749B9AA30F53}"/>
-                </a:ext>
-              </a:extLst>
-            </p:cNvPr>
-            <p:cNvSpPr/>
-            <p:nvPr/>
-          </p:nvSpPr>
-          <p:spPr>
-            <a:xfrm>
-              <a:off x="1866900" y="-800100"/>
-              <a:ext cx="8458200" cy="8458200"/>
-            </a:xfrm>
-            <a:prstGeom prst="rect">
-              <a:avLst/>
-            </a:prstGeom>
-            <a:solidFill>
-              <a:schemeClr val="bg1"/>
-            </a:solidFill>
-            <a:ln>
-              <a:noFill/>
-            </a:ln>
-          </p:spPr>
-          <p:style>
-            <a:lnRef idx="2">
-              <a:schemeClr val="accent1">
-                <a:shade val="15000"/>
-              </a:schemeClr>
-            </a:lnRef>
-            <a:fillRef idx="1">
-              <a:schemeClr val="accent1"/>
-            </a:fillRef>
-            <a:effectRef idx="0">
-              <a:schemeClr val="accent1"/>
-            </a:effectRef>
-            <a:fontRef idx="minor">
-              <a:schemeClr val="lt1"/>
-            </a:fontRef>
-          </p:style>
-          <p:txBody>
-            <a:bodyPr rtlCol="0" anchor="ctr"/>
-            <a:lstStyle/>
-            <a:p>
-              <a:pPr algn="ctr"/>
-              <a:endParaRPr lang="ko-KR" altLang="en-US"/>
-            </a:p>
-          </p:txBody>
-        </p:sp>
-        <p:pic>
-          <p:nvPicPr>
-            <p:cNvPr id="3" name="그래픽 2">
-              <a:extLst>
-                <a:ext uri="{FF2B5EF4-FFF2-40B4-BE49-F238E27FC236}">
-                  <a16:creationId xmlns:a16="http://schemas.microsoft.com/office/drawing/2014/main" id="{25815B88-C803-72D0-1910-7446D47E6F71}"/>
-                </a:ext>
-              </a:extLst>
-            </p:cNvPr>
-            <p:cNvPicPr>
-              <a:picLocks noChangeAspect="1"/>
-            </p:cNvPicPr>
-            <p:nvPr/>
-          </p:nvPicPr>
-          <p:blipFill>
-            <a:blip r:embed="rId2">
-              <a:extLst>
-                <a:ext uri="{28A0092B-C50C-407E-A947-70E740481C1C}">
-                  <a14:useLocalDpi xmlns:a14="http://schemas.microsoft.com/office/drawing/2010/main" val="0"/>
-                </a:ext>
-                <a:ext uri="{96DAC541-7B7A-43D3-8B79-37D633B846F1}">
-                  <asvg:svgBlip xmlns:asvg="http://schemas.microsoft.com/office/drawing/2016/SVG/main" r:embed="rId3"/>
-                </a:ext>
-              </a:extLst>
-            </a:blip>
-            <a:stretch>
-              <a:fillRect/>
-            </a:stretch>
-          </p:blipFill>
-          <p:spPr>
-            <a:xfrm>
-              <a:off x="2324100" y="-342900"/>
-              <a:ext cx="7543800" cy="7543800"/>
-            </a:xfrm>
-            <a:prstGeom prst="rect">
-              <a:avLst/>
-            </a:prstGeom>
-          </p:spPr>
-        </p:pic>
-      </p:grpSp>
-    </p:spTree>
-    <p:extLst>
-      <p:ext uri="{BB962C8B-B14F-4D97-AF65-F5344CB8AC3E}">
-        <p14:creationId xmlns:p14="http://schemas.microsoft.com/office/powerpoint/2010/main" val="1816107592"/>
       </p:ext>
     </p:extLst>
   </p:cSld>
@@ -4694,12 +5020,6 @@
 </file>
 
 <file path=customXml/item2.xml><?xml version="1.0" encoding="utf-8"?>
-<p:properties xmlns:p="http://schemas.microsoft.com/office/2006/metadata/properties" xmlns:xsi="http://www.w3.org/2001/XMLSchema-instance" xmlns:pc="http://schemas.microsoft.com/office/infopath/2007/PartnerControls">
-  <documentManagement/>
-</p:properties>
-</file>
-
-<file path=customXml/item3.xml><?xml version="1.0" encoding="utf-8"?>
 <ct:contentTypeSchema xmlns:ct="http://schemas.microsoft.com/office/2006/metadata/contentType" xmlns:ma="http://schemas.microsoft.com/office/2006/metadata/properties/metaAttributes" ct:_="" ma:_="" ma:contentTypeName="Document" ma:contentTypeID="0x010100CDF8B3361623154987E8CE09966ECFA0" ma:contentTypeVersion="2" ma:contentTypeDescription="Create a new document." ma:contentTypeScope="" ma:versionID="a3e27ad6fbd8c67b374cc054d182804a">
   <xsd:schema xmlns:xsd="http://www.w3.org/2001/XMLSchema" xmlns:xs="http://www.w3.org/2001/XMLSchema" xmlns:p="http://schemas.microsoft.com/office/2006/metadata/properties" xmlns:ns3="0c7f8f23-a4b1-4082-876c-c069bf5ccd66" targetNamespace="http://schemas.microsoft.com/office/2006/metadata/properties" ma:root="true" ma:fieldsID="0596d452998d4608345a412193410b21" ns3:_="">
     <xsd:import namespace="0c7f8f23-a4b1-4082-876c-c069bf5ccd66"/>
@@ -4831,6 +5151,12 @@
 </ct:contentTypeSchema>
 </file>
 
+<file path=customXml/item3.xml><?xml version="1.0" encoding="utf-8"?>
+<p:properties xmlns:p="http://schemas.microsoft.com/office/2006/metadata/properties" xmlns:xsi="http://www.w3.org/2001/XMLSchema-instance" xmlns:pc="http://schemas.microsoft.com/office/infopath/2007/PartnerControls">
+  <documentManagement/>
+</p:properties>
+</file>
+
 <file path=customXml/itemProps1.xml><?xml version="1.0" encoding="utf-8"?>
 <ds:datastoreItem xmlns:ds="http://schemas.openxmlformats.org/officeDocument/2006/customXml" ds:itemID="{3D1969B6-0399-47DA-BE37-18C1254DB65A}">
   <ds:schemaRefs>
@@ -4840,22 +5166,6 @@
 </file>
 
 <file path=customXml/itemProps2.xml><?xml version="1.0" encoding="utf-8"?>
-<ds:datastoreItem xmlns:ds="http://schemas.openxmlformats.org/officeDocument/2006/customXml" ds:itemID="{501D3E93-C708-4B92-B0BC-125FF306CD8A}">
-  <ds:schemaRefs>
-    <ds:schemaRef ds:uri="http://www.w3.org/XML/1998/namespace"/>
-    <ds:schemaRef ds:uri="http://purl.org/dc/dcmitype/"/>
-    <ds:schemaRef ds:uri="http://schemas.openxmlformats.org/package/2006/metadata/core-properties"/>
-    <ds:schemaRef ds:uri="http://schemas.microsoft.com/office/2006/documentManagement/types"/>
-    <ds:schemaRef ds:uri="0c7f8f23-a4b1-4082-876c-c069bf5ccd66"/>
-    <ds:schemaRef ds:uri="http://purl.org/dc/elements/1.1/"/>
-    <ds:schemaRef ds:uri="http://schemas.microsoft.com/office/2006/metadata/properties"/>
-    <ds:schemaRef ds:uri="http://schemas.microsoft.com/office/infopath/2007/PartnerControls"/>
-    <ds:schemaRef ds:uri="http://purl.org/dc/terms/"/>
-  </ds:schemaRefs>
-</ds:datastoreItem>
-</file>
-
-<file path=customXml/itemProps3.xml><?xml version="1.0" encoding="utf-8"?>
 <ds:datastoreItem xmlns:ds="http://schemas.openxmlformats.org/officeDocument/2006/customXml" ds:itemID="{63EA57E7-B7A4-4533-BCF6-F660521C0445}">
   <ds:schemaRefs>
     <ds:schemaRef ds:uri="http://schemas.microsoft.com/office/2006/metadata/contentType"/>
@@ -4871,4 +5181,20 @@
     <ds:schemaRef ds:uri="http://schemas.microsoft.com/internal/obd"/>
   </ds:schemaRefs>
 </ds:datastoreItem>
+</file>
+
+<file path=customXml/itemProps3.xml><?xml version="1.0" encoding="utf-8"?>
+<ds:datastoreItem xmlns:ds="http://schemas.openxmlformats.org/officeDocument/2006/customXml" ds:itemID="{501D3E93-C708-4B92-B0BC-125FF306CD8A}">
+  <ds:schemaRefs>
+    <ds:schemaRef ds:uri="http://www.w3.org/XML/1998/namespace"/>
+    <ds:schemaRef ds:uri="http://purl.org/dc/dcmitype/"/>
+    <ds:schemaRef ds:uri="http://schemas.openxmlformats.org/package/2006/metadata/core-properties"/>
+    <ds:schemaRef ds:uri="http://schemas.microsoft.com/office/2006/documentManagement/types"/>
+    <ds:schemaRef ds:uri="0c7f8f23-a4b1-4082-876c-c069bf5ccd66"/>
+    <ds:schemaRef ds:uri="http://purl.org/dc/elements/1.1/"/>
+    <ds:schemaRef ds:uri="http://schemas.microsoft.com/office/2006/metadata/properties"/>
+    <ds:schemaRef ds:uri="http://schemas.microsoft.com/office/infopath/2007/PartnerControls"/>
+    <ds:schemaRef ds:uri="http://purl.org/dc/terms/"/>
+  </ds:schemaRefs>
+</ds:datastoreItem>
 </file>
</xml_diff>